<commit_message>
Added Code to get the AverageNumberOfRidersForEachDayOfTheWeek to work
It Works! It Works! WOOOOOOOOOOOOOOOOT!
</commit_message>
<xml_diff>
--- a/Source/Data/charts/Powerpoint_format/average_ridership_2023.pptx
+++ b/Source/Data/charts/Powerpoint_format/average_ridership_2023.pptx
@@ -3104,7 +3104,7 @@
           <a:lstStyle/>
           <a:p>
             <a:r>
-              <a:t>Average Ridership for Each Day of the Week (2023)</a:t>
+              <a:t>Average Daily Subway Ridership by Day of Week (2023)</a:t>
             </a:r>
           </a:p>
         </p:txBody>
@@ -3125,8 +3125,8 @@
         </p:blipFill>
         <p:spPr>
           <a:xfrm>
-            <a:off x="1371600" y="1371600"/>
-            <a:ext cx="6400800" cy="3200400"/>
+            <a:off x="914400" y="1371600"/>
+            <a:ext cx="7315200" cy="3616618"/>
           </a:xfrm>
           <a:prstGeom prst="rect">
             <a:avLst/>

</xml_diff>